<commit_message>
Update to spec following feedback
</commit_message>
<xml_diff>
--- a/specification/UI_Task_Guide.pptx
+++ b/specification/UI_Task_Guide.pptx
@@ -226,7 +226,7 @@
           <a:p>
             <a:fld id="{9E9BFBE1-0493-E645-A58B-AC4966673A7D}" type="datetimeFigureOut">
               <a:rPr lang="en-US" smtClean="0"/>
-              <a:t>22/01/2015</a:t>
+              <a:t>01/07/15</a:t>
             </a:fld>
             <a:endParaRPr lang="en-US" dirty="0"/>
           </a:p>
@@ -11889,12 +11889,6 @@
           <a:bodyPr/>
           <a:lstStyle/>
           <a:p>
-            <a:r>
-              <a:rPr lang="en-US" sz="1600" dirty="0" smtClean="0"/>
-              <a:t>January 2015</a:t>
-            </a:r>
-          </a:p>
-          <a:p>
             <a:endParaRPr lang="en-US" dirty="0"/>
           </a:p>
         </p:txBody>
@@ -15324,19 +15318,7 @@
                 <a:cs typeface="Helvetica Light"/>
                 <a:sym typeface="Helvetica Neue"/>
               </a:rPr>
-              <a:t>Measurements </a:t>
-            </a:r>
-            <a:r>
-              <a:rPr lang="en-US" sz="2000" i="0" u="none" strike="noStrike" cap="none" baseline="0" dirty="0" smtClean="0">
-                <a:solidFill>
-                  <a:srgbClr val="006AA5"/>
-                </a:solidFill>
-                <a:latin typeface="Helvetica Light"/>
-                <a:ea typeface="Helvetica Neue"/>
-                <a:cs typeface="Helvetica Light"/>
-                <a:sym typeface="Helvetica Neue"/>
-              </a:rPr>
-              <a:t>(top bar)</a:t>
+              <a:t>Measurements (top bar)</a:t>
             </a:r>
             <a:endParaRPr lang="en-US" sz="2000" i="0" u="none" strike="noStrike" cap="none" baseline="0" dirty="0">
               <a:solidFill>
@@ -16930,7 +16912,19 @@
                 <a:cs typeface="Helvetica Neue"/>
                 <a:sym typeface="Helvetica Neue"/>
               </a:rPr>
-              <a:t>#ff08518</a:t>
+              <a:t>#</a:t>
+            </a:r>
+            <a:r>
+              <a:rPr lang="en-US" sz="900" dirty="0" smtClean="0">
+                <a:solidFill>
+                  <a:srgbClr val="006AA5"/>
+                </a:solidFill>
+                <a:latin typeface="Helvetica Neue"/>
+                <a:ea typeface="Helvetica Neue"/>
+                <a:cs typeface="Helvetica Neue"/>
+                <a:sym typeface="Helvetica Neue"/>
+              </a:rPr>
+              <a:t>f08518</a:t>
             </a:r>
             <a:endParaRPr lang="en-US" sz="900" i="0" u="none" strike="noStrike" cap="none" baseline="0" dirty="0">
               <a:solidFill>

</xml_diff>